<commit_message>
Slides and Supporting Materials  for Day 10
</commit_message>
<xml_diff>
--- a/Day 9/Slides/3. Bootstrapping a Simple Application/bootstrapping-a-simple-application-slides.pptx
+++ b/Day 9/Slides/3. Bootstrapping a Simple Application/bootstrapping-a-simple-application-slides.pptx
@@ -8220,7 +8220,7 @@
         <p:spPr>
           <a:xfrm>
             <a:off x="5226050" y="2520188"/>
-            <a:ext cx="2945765" cy="1586230"/>
+            <a:ext cx="2945765" cy="1584960"/>
           </a:xfrm>
           <a:prstGeom prst="rect">
             <a:avLst/>
@@ -8302,24 +8302,14 @@
               <a:t>in </a:t>
             </a:r>
             <a:r>
-              <a:rPr sz="2400" spc="5" dirty="0">
+              <a:rPr lang="en-US" sz="2400" spc="5" dirty="0">
                 <a:solidFill>
                   <a:srgbClr val="2A9FBC"/>
                 </a:solidFill>
                 <a:latin typeface="Verdana" panose="020B0604030504040204"/>
                 <a:cs typeface="Verdana" panose="020B0604030504040204"/>
               </a:rPr>
-              <a:t>IntelliJ </a:t>
-            </a:r>
-            <a:r>
-              <a:rPr sz="2400" spc="10" dirty="0">
-                <a:solidFill>
-                  <a:srgbClr val="2A9FBC"/>
-                </a:solidFill>
-                <a:latin typeface="Verdana" panose="020B0604030504040204"/>
-                <a:cs typeface="Verdana" panose="020B0604030504040204"/>
-              </a:rPr>
-              <a:t> </a:t>
+              <a:t>STS </a:t>
             </a:r>
             <a:r>
               <a:rPr sz="2400" spc="20" dirty="0">

</xml_diff>